<commit_message>
Updated Main Circuit Diagram, Added Main Loops
Updated Circuit Diagram to account for new power layout. Added the
following files:
- encoderMain.c: The first version of the main loop for the encoder
brain. Reads encoder changes, calculates x,y, and theta, and broadcasts
position packet.
- motorMain.c: The first version of the main loop for the motor brain.
Reads command packets, validates them, sends an appropriate response,
and updates motor targets.
- sendEgg.c: Basic serial broadcast test.
- sendPos.c: Broadcasts generic position packets following a set
pattern. Useful for testing renders on the controller side.
- wiringPi.tar.gz: The library used to interface with the gpio pins and
serial ports.
</commit_message>
<xml_diff>
--- a/Design+Setup Notes/Circuit Diagrams.pptx
+++ b/Design+Setup Notes/Circuit Diagrams.pptx
@@ -268,7 +268,7 @@
           <a:p>
             <a:fld id="{CEA465B2-29EA-4E60-A66D-641744856D1F}" type="datetimeFigureOut">
               <a:rPr lang="en-US" smtClean="0"/>
-              <a:t>1/26/2018</a:t>
+              <a:t>2/1/2018</a:t>
             </a:fld>
             <a:endParaRPr lang="en-US"/>
           </a:p>
@@ -466,7 +466,7 @@
           <a:p>
             <a:fld id="{CEA465B2-29EA-4E60-A66D-641744856D1F}" type="datetimeFigureOut">
               <a:rPr lang="en-US" smtClean="0"/>
-              <a:t>1/26/2018</a:t>
+              <a:t>2/1/2018</a:t>
             </a:fld>
             <a:endParaRPr lang="en-US"/>
           </a:p>
@@ -674,7 +674,7 @@
           <a:p>
             <a:fld id="{CEA465B2-29EA-4E60-A66D-641744856D1F}" type="datetimeFigureOut">
               <a:rPr lang="en-US" smtClean="0"/>
-              <a:t>1/26/2018</a:t>
+              <a:t>2/1/2018</a:t>
             </a:fld>
             <a:endParaRPr lang="en-US"/>
           </a:p>
@@ -872,7 +872,7 @@
           <a:p>
             <a:fld id="{CEA465B2-29EA-4E60-A66D-641744856D1F}" type="datetimeFigureOut">
               <a:rPr lang="en-US" smtClean="0"/>
-              <a:t>1/26/2018</a:t>
+              <a:t>2/1/2018</a:t>
             </a:fld>
             <a:endParaRPr lang="en-US"/>
           </a:p>
@@ -1147,7 +1147,7 @@
           <a:p>
             <a:fld id="{CEA465B2-29EA-4E60-A66D-641744856D1F}" type="datetimeFigureOut">
               <a:rPr lang="en-US" smtClean="0"/>
-              <a:t>1/26/2018</a:t>
+              <a:t>2/1/2018</a:t>
             </a:fld>
             <a:endParaRPr lang="en-US"/>
           </a:p>
@@ -1412,7 +1412,7 @@
           <a:p>
             <a:fld id="{CEA465B2-29EA-4E60-A66D-641744856D1F}" type="datetimeFigureOut">
               <a:rPr lang="en-US" smtClean="0"/>
-              <a:t>1/26/2018</a:t>
+              <a:t>2/1/2018</a:t>
             </a:fld>
             <a:endParaRPr lang="en-US"/>
           </a:p>
@@ -1824,7 +1824,7 @@
           <a:p>
             <a:fld id="{CEA465B2-29EA-4E60-A66D-641744856D1F}" type="datetimeFigureOut">
               <a:rPr lang="en-US" smtClean="0"/>
-              <a:t>1/26/2018</a:t>
+              <a:t>2/1/2018</a:t>
             </a:fld>
             <a:endParaRPr lang="en-US"/>
           </a:p>
@@ -1965,7 +1965,7 @@
           <a:p>
             <a:fld id="{CEA465B2-29EA-4E60-A66D-641744856D1F}" type="datetimeFigureOut">
               <a:rPr lang="en-US" smtClean="0"/>
-              <a:t>1/26/2018</a:t>
+              <a:t>2/1/2018</a:t>
             </a:fld>
             <a:endParaRPr lang="en-US"/>
           </a:p>
@@ -2078,7 +2078,7 @@
           <a:p>
             <a:fld id="{CEA465B2-29EA-4E60-A66D-641744856D1F}" type="datetimeFigureOut">
               <a:rPr lang="en-US" smtClean="0"/>
-              <a:t>1/26/2018</a:t>
+              <a:t>2/1/2018</a:t>
             </a:fld>
             <a:endParaRPr lang="en-US"/>
           </a:p>
@@ -2389,7 +2389,7 @@
           <a:p>
             <a:fld id="{CEA465B2-29EA-4E60-A66D-641744856D1F}" type="datetimeFigureOut">
               <a:rPr lang="en-US" smtClean="0"/>
-              <a:t>1/26/2018</a:t>
+              <a:t>2/1/2018</a:t>
             </a:fld>
             <a:endParaRPr lang="en-US"/>
           </a:p>
@@ -2677,7 +2677,7 @@
           <a:p>
             <a:fld id="{CEA465B2-29EA-4E60-A66D-641744856D1F}" type="datetimeFigureOut">
               <a:rPr lang="en-US" smtClean="0"/>
-              <a:t>1/26/2018</a:t>
+              <a:t>2/1/2018</a:t>
             </a:fld>
             <a:endParaRPr lang="en-US"/>
           </a:p>
@@ -2918,7 +2918,7 @@
           <a:p>
             <a:fld id="{CEA465B2-29EA-4E60-A66D-641744856D1F}" type="datetimeFigureOut">
               <a:rPr lang="en-US" smtClean="0"/>
-              <a:t>1/26/2018</a:t>
+              <a:t>2/1/2018</a:t>
             </a:fld>
             <a:endParaRPr lang="en-US"/>
           </a:p>
@@ -17314,7 +17314,7 @@
         </p:nvSpPr>
         <p:spPr>
           <a:xfrm>
-            <a:off x="4214362" y="1427132"/>
+            <a:off x="6162587" y="1122751"/>
             <a:ext cx="1441734" cy="731354"/>
           </a:xfrm>
           <a:prstGeom prst="rect">
@@ -17366,7 +17366,7 @@
         </p:nvSpPr>
         <p:spPr>
           <a:xfrm>
-            <a:off x="4529584" y="1385633"/>
+            <a:off x="6477809" y="1081252"/>
             <a:ext cx="189715" cy="46130"/>
           </a:xfrm>
           <a:prstGeom prst="rect">
@@ -17420,7 +17420,7 @@
         </p:nvSpPr>
         <p:spPr>
           <a:xfrm>
-            <a:off x="4305596" y="1385633"/>
+            <a:off x="6253821" y="1081252"/>
             <a:ext cx="189715" cy="46130"/>
           </a:xfrm>
           <a:prstGeom prst="rect">
@@ -20251,7 +20251,7 @@
         </p:nvSpPr>
         <p:spPr>
           <a:xfrm>
-            <a:off x="4217911" y="455169"/>
+            <a:off x="6166136" y="150788"/>
             <a:ext cx="1441734" cy="731354"/>
           </a:xfrm>
           <a:prstGeom prst="rect">
@@ -20303,7 +20303,7 @@
         </p:nvSpPr>
         <p:spPr>
           <a:xfrm>
-            <a:off x="4533133" y="413670"/>
+            <a:off x="6481358" y="109289"/>
             <a:ext cx="189715" cy="46130"/>
           </a:xfrm>
           <a:prstGeom prst="rect">
@@ -20357,7 +20357,7 @@
         </p:nvSpPr>
         <p:spPr>
           <a:xfrm>
-            <a:off x="4309145" y="413670"/>
+            <a:off x="6257370" y="109289"/>
             <a:ext cx="189715" cy="46130"/>
           </a:xfrm>
           <a:prstGeom prst="rect">
@@ -21141,7 +21141,7 @@
         <p:spPr>
           <a:xfrm>
             <a:off x="11586575" y="576637"/>
-            <a:ext cx="324128" cy="169277"/>
+            <a:ext cx="546945" cy="169277"/>
           </a:xfrm>
           <a:prstGeom prst="rect">
             <a:avLst/>
@@ -21162,7 +21162,7 @@
                   </a:schemeClr>
                 </a:solidFill>
               </a:rPr>
-              <a:t>INT A</a:t>
+              <a:t>INTERRUPT A</a:t>
             </a:r>
             <a:endParaRPr lang="en-US" sz="700" dirty="0">
               <a:solidFill>
@@ -21189,7 +21189,7 @@
         <p:spPr>
           <a:xfrm>
             <a:off x="11585750" y="665302"/>
-            <a:ext cx="322524" cy="169277"/>
+            <a:ext cx="530915" cy="169277"/>
           </a:xfrm>
           <a:prstGeom prst="rect">
             <a:avLst/>
@@ -21211,7 +21211,7 @@
                   </a:schemeClr>
                 </a:solidFill>
               </a:rPr>
-              <a:t>INT B</a:t>
+              <a:t>INTERRUPT B</a:t>
             </a:r>
             <a:endParaRPr lang="en-US" sz="700" dirty="0">
               <a:solidFill>
@@ -21330,7 +21330,7 @@
         </p:nvCxnSpPr>
         <p:spPr>
           <a:xfrm flipH="1">
-            <a:off x="4031479" y="4647870"/>
+            <a:off x="4036207" y="4648581"/>
             <a:ext cx="558559" cy="0"/>
           </a:xfrm>
           <a:prstGeom prst="line">
@@ -22428,7 +22428,7 @@
         </p:nvSpPr>
         <p:spPr>
           <a:xfrm>
-            <a:off x="4093818" y="411061"/>
+            <a:off x="6042043" y="106680"/>
             <a:ext cx="285235" cy="981511"/>
           </a:xfrm>
           <a:custGeom>
@@ -22518,7 +22518,7 @@
         </p:nvSpPr>
         <p:spPr>
           <a:xfrm>
-            <a:off x="4305943" y="437232"/>
+            <a:off x="6254168" y="132851"/>
             <a:ext cx="285235" cy="981511"/>
           </a:xfrm>
           <a:custGeom>
@@ -22596,6 +22596,180 @@
           </a:p>
         </p:txBody>
       </p:sp>
+      <p:sp>
+        <p:nvSpPr>
+          <p:cNvPr id="5" name="Rectangle 4">
+            <a:extLst>
+              <a:ext uri="{FF2B5EF4-FFF2-40B4-BE49-F238E27FC236}">
+                <a16:creationId xmlns:a16="http://schemas.microsoft.com/office/drawing/2014/main" id="{079BF47A-EB03-4891-AFB5-83CF5F9E6D47}"/>
+              </a:ext>
+            </a:extLst>
+          </p:cNvPr>
+          <p:cNvSpPr/>
+          <p:nvPr/>
+        </p:nvSpPr>
+        <p:spPr>
+          <a:xfrm>
+            <a:off x="2978150" y="2085975"/>
+            <a:ext cx="5095560" cy="257565"/>
+          </a:xfrm>
+          <a:prstGeom prst="rect">
+            <a:avLst/>
+          </a:prstGeom>
+          <a:solidFill>
+            <a:schemeClr val="bg1">
+              <a:lumMod val="95000"/>
+            </a:schemeClr>
+          </a:solidFill>
+          <a:ln>
+            <a:solidFill>
+              <a:schemeClr val="bg1">
+                <a:lumMod val="95000"/>
+              </a:schemeClr>
+            </a:solidFill>
+          </a:ln>
+        </p:spPr>
+        <p:style>
+          <a:lnRef idx="2">
+            <a:schemeClr val="accent1">
+              <a:shade val="50000"/>
+            </a:schemeClr>
+          </a:lnRef>
+          <a:fillRef idx="1">
+            <a:schemeClr val="accent1"/>
+          </a:fillRef>
+          <a:effectRef idx="0">
+            <a:schemeClr val="accent1"/>
+          </a:effectRef>
+          <a:fontRef idx="minor">
+            <a:schemeClr val="lt1"/>
+          </a:fontRef>
+        </p:style>
+        <p:txBody>
+          <a:bodyPr rtlCol="0" anchor="ctr"/>
+          <a:lstStyle/>
+          <a:p>
+            <a:pPr algn="ctr"/>
+            <a:endParaRPr lang="en-US"/>
+          </a:p>
+        </p:txBody>
+      </p:sp>
+      <p:sp>
+        <p:nvSpPr>
+          <p:cNvPr id="20" name="Rectangle 19">
+            <a:extLst>
+              <a:ext uri="{FF2B5EF4-FFF2-40B4-BE49-F238E27FC236}">
+                <a16:creationId xmlns:a16="http://schemas.microsoft.com/office/drawing/2014/main" id="{B265F20B-CFEC-4ECE-9620-A88DFDA4E5C3}"/>
+              </a:ext>
+            </a:extLst>
+          </p:cNvPr>
+          <p:cNvSpPr/>
+          <p:nvPr/>
+        </p:nvSpPr>
+        <p:spPr>
+          <a:xfrm>
+            <a:off x="2999794" y="2145509"/>
+            <a:ext cx="5059826" cy="45719"/>
+          </a:xfrm>
+          <a:prstGeom prst="rect">
+            <a:avLst/>
+          </a:prstGeom>
+          <a:solidFill>
+            <a:schemeClr val="bg1">
+              <a:lumMod val="85000"/>
+            </a:schemeClr>
+          </a:solidFill>
+          <a:ln>
+            <a:solidFill>
+              <a:schemeClr val="bg1">
+                <a:lumMod val="85000"/>
+              </a:schemeClr>
+            </a:solidFill>
+          </a:ln>
+        </p:spPr>
+        <p:style>
+          <a:lnRef idx="2">
+            <a:schemeClr val="accent1">
+              <a:shade val="50000"/>
+            </a:schemeClr>
+          </a:lnRef>
+          <a:fillRef idx="1">
+            <a:schemeClr val="accent1"/>
+          </a:fillRef>
+          <a:effectRef idx="0">
+            <a:schemeClr val="accent1"/>
+          </a:effectRef>
+          <a:fontRef idx="minor">
+            <a:schemeClr val="lt1"/>
+          </a:fontRef>
+        </p:style>
+        <p:txBody>
+          <a:bodyPr rtlCol="0" anchor="ctr"/>
+          <a:lstStyle/>
+          <a:p>
+            <a:pPr algn="ctr"/>
+            <a:endParaRPr lang="en-US"/>
+          </a:p>
+        </p:txBody>
+      </p:sp>
+      <p:sp>
+        <p:nvSpPr>
+          <p:cNvPr id="145" name="Rectangle 144">
+            <a:extLst>
+              <a:ext uri="{FF2B5EF4-FFF2-40B4-BE49-F238E27FC236}">
+                <a16:creationId xmlns:a16="http://schemas.microsoft.com/office/drawing/2014/main" id="{B04EAE76-E979-4DAD-B724-F6F832E8BFAC}"/>
+              </a:ext>
+            </a:extLst>
+          </p:cNvPr>
+          <p:cNvSpPr/>
+          <p:nvPr/>
+        </p:nvSpPr>
+        <p:spPr>
+          <a:xfrm>
+            <a:off x="2999794" y="2249695"/>
+            <a:ext cx="5059826" cy="45719"/>
+          </a:xfrm>
+          <a:prstGeom prst="rect">
+            <a:avLst/>
+          </a:prstGeom>
+          <a:solidFill>
+            <a:schemeClr val="bg1">
+              <a:lumMod val="85000"/>
+            </a:schemeClr>
+          </a:solidFill>
+          <a:ln>
+            <a:solidFill>
+              <a:schemeClr val="bg1">
+                <a:lumMod val="85000"/>
+              </a:schemeClr>
+            </a:solidFill>
+          </a:ln>
+        </p:spPr>
+        <p:style>
+          <a:lnRef idx="2">
+            <a:schemeClr val="accent1">
+              <a:shade val="50000"/>
+            </a:schemeClr>
+          </a:lnRef>
+          <a:fillRef idx="1">
+            <a:schemeClr val="accent1"/>
+          </a:fillRef>
+          <a:effectRef idx="0">
+            <a:schemeClr val="accent1"/>
+          </a:effectRef>
+          <a:fontRef idx="minor">
+            <a:schemeClr val="lt1"/>
+          </a:fontRef>
+        </p:style>
+        <p:txBody>
+          <a:bodyPr rtlCol="0" anchor="ctr"/>
+          <a:lstStyle/>
+          <a:p>
+            <a:pPr algn="ctr"/>
+            <a:endParaRPr lang="en-US"/>
+          </a:p>
+        </p:txBody>
+      </p:sp>
       <p:cxnSp>
         <p:nvCxnSpPr>
           <p:cNvPr id="313" name="Straight Connector 312">
@@ -22605,13 +22779,15 @@
               </a:ext>
             </a:extLst>
           </p:cNvPr>
-          <p:cNvCxnSpPr/>
+          <p:cNvCxnSpPr>
+            <a:cxnSpLocks/>
+          </p:cNvCxnSpPr>
           <p:nvPr/>
         </p:nvCxnSpPr>
         <p:spPr>
           <a:xfrm flipV="1">
-            <a:off x="4624441" y="1427132"/>
-            <a:ext cx="0" cy="2292467"/>
+            <a:off x="6570000" y="1122754"/>
+            <a:ext cx="2667" cy="1153671"/>
           </a:xfrm>
           <a:prstGeom prst="line">
             <a:avLst/>
@@ -22648,13 +22824,15 @@
               </a:ext>
             </a:extLst>
           </p:cNvPr>
-          <p:cNvCxnSpPr/>
+          <p:cNvCxnSpPr>
+            <a:cxnSpLocks/>
+          </p:cNvCxnSpPr>
           <p:nvPr/>
         </p:nvCxnSpPr>
         <p:spPr>
           <a:xfrm flipV="1">
-            <a:off x="4379053" y="1418338"/>
-            <a:ext cx="0" cy="2292467"/>
+            <a:off x="6327278" y="1113958"/>
+            <a:ext cx="0" cy="1044655"/>
           </a:xfrm>
           <a:prstGeom prst="line">
             <a:avLst/>
@@ -22662,6 +22840,536 @@
           <a:ln w="38100">
             <a:solidFill>
               <a:srgbClr val="FF0000"/>
+            </a:solidFill>
+          </a:ln>
+        </p:spPr>
+        <p:style>
+          <a:lnRef idx="1">
+            <a:schemeClr val="accent1"/>
+          </a:lnRef>
+          <a:fillRef idx="0">
+            <a:schemeClr val="accent1"/>
+          </a:fillRef>
+          <a:effectRef idx="0">
+            <a:schemeClr val="accent1"/>
+          </a:effectRef>
+          <a:fontRef idx="minor">
+            <a:schemeClr val="tx1"/>
+          </a:fontRef>
+        </p:style>
+      </p:cxnSp>
+      <p:cxnSp>
+        <p:nvCxnSpPr>
+          <p:cNvPr id="146" name="Straight Connector 145">
+            <a:extLst>
+              <a:ext uri="{FF2B5EF4-FFF2-40B4-BE49-F238E27FC236}">
+                <a16:creationId xmlns:a16="http://schemas.microsoft.com/office/drawing/2014/main" id="{FAFDB69C-2949-4688-BA5C-F896592EA0F4}"/>
+              </a:ext>
+            </a:extLst>
+          </p:cNvPr>
+          <p:cNvCxnSpPr>
+            <a:cxnSpLocks/>
+          </p:cNvCxnSpPr>
+          <p:nvPr/>
+        </p:nvCxnSpPr>
+        <p:spPr>
+          <a:xfrm flipV="1">
+            <a:off x="3787645" y="4681917"/>
+            <a:ext cx="77525" cy="1"/>
+          </a:xfrm>
+          <a:prstGeom prst="line">
+            <a:avLst/>
+          </a:prstGeom>
+          <a:ln w="38100">
+            <a:solidFill>
+              <a:srgbClr val="FF0000"/>
+            </a:solidFill>
+          </a:ln>
+        </p:spPr>
+        <p:style>
+          <a:lnRef idx="1">
+            <a:schemeClr val="accent1"/>
+          </a:lnRef>
+          <a:fillRef idx="0">
+            <a:schemeClr val="accent1"/>
+          </a:fillRef>
+          <a:effectRef idx="0">
+            <a:schemeClr val="accent1"/>
+          </a:effectRef>
+          <a:fontRef idx="minor">
+            <a:schemeClr val="tx1"/>
+          </a:fontRef>
+        </p:style>
+      </p:cxnSp>
+      <p:cxnSp>
+        <p:nvCxnSpPr>
+          <p:cNvPr id="150" name="Straight Connector 149">
+            <a:extLst>
+              <a:ext uri="{FF2B5EF4-FFF2-40B4-BE49-F238E27FC236}">
+                <a16:creationId xmlns:a16="http://schemas.microsoft.com/office/drawing/2014/main" id="{D931E59C-E0C8-4B08-9769-FDC37340D062}"/>
+              </a:ext>
+            </a:extLst>
+          </p:cNvPr>
+          <p:cNvCxnSpPr>
+            <a:cxnSpLocks/>
+          </p:cNvCxnSpPr>
+          <p:nvPr/>
+        </p:nvCxnSpPr>
+        <p:spPr>
+          <a:xfrm flipV="1">
+            <a:off x="3770572" y="5819205"/>
+            <a:ext cx="77525" cy="1"/>
+          </a:xfrm>
+          <a:prstGeom prst="line">
+            <a:avLst/>
+          </a:prstGeom>
+          <a:ln w="38100">
+            <a:solidFill>
+              <a:srgbClr val="FF0000"/>
+            </a:solidFill>
+          </a:ln>
+        </p:spPr>
+        <p:style>
+          <a:lnRef idx="1">
+            <a:schemeClr val="accent1"/>
+          </a:lnRef>
+          <a:fillRef idx="0">
+            <a:schemeClr val="accent1"/>
+          </a:fillRef>
+          <a:effectRef idx="0">
+            <a:schemeClr val="accent1"/>
+          </a:effectRef>
+          <a:fontRef idx="minor">
+            <a:schemeClr val="tx1"/>
+          </a:fontRef>
+        </p:style>
+      </p:cxnSp>
+      <p:cxnSp>
+        <p:nvCxnSpPr>
+          <p:cNvPr id="152" name="Straight Connector 151">
+            <a:extLst>
+              <a:ext uri="{FF2B5EF4-FFF2-40B4-BE49-F238E27FC236}">
+                <a16:creationId xmlns:a16="http://schemas.microsoft.com/office/drawing/2014/main" id="{E65B438B-929B-49AF-B99B-C51F3893A3F3}"/>
+              </a:ext>
+            </a:extLst>
+          </p:cNvPr>
+          <p:cNvCxnSpPr>
+            <a:cxnSpLocks/>
+          </p:cNvCxnSpPr>
+          <p:nvPr/>
+        </p:nvCxnSpPr>
+        <p:spPr>
+          <a:xfrm flipV="1">
+            <a:off x="3846672" y="2180773"/>
+            <a:ext cx="0" cy="3674373"/>
+          </a:xfrm>
+          <a:prstGeom prst="line">
+            <a:avLst/>
+          </a:prstGeom>
+          <a:ln w="38100">
+            <a:solidFill>
+              <a:srgbClr val="FF0000"/>
+            </a:solidFill>
+          </a:ln>
+        </p:spPr>
+        <p:style>
+          <a:lnRef idx="1">
+            <a:schemeClr val="accent1"/>
+          </a:lnRef>
+          <a:fillRef idx="0">
+            <a:schemeClr val="accent1"/>
+          </a:fillRef>
+          <a:effectRef idx="0">
+            <a:schemeClr val="accent1"/>
+          </a:effectRef>
+          <a:fontRef idx="minor">
+            <a:schemeClr val="tx1"/>
+          </a:fontRef>
+        </p:style>
+      </p:cxnSp>
+      <p:cxnSp>
+        <p:nvCxnSpPr>
+          <p:cNvPr id="153" name="Straight Connector 152">
+            <a:extLst>
+              <a:ext uri="{FF2B5EF4-FFF2-40B4-BE49-F238E27FC236}">
+                <a16:creationId xmlns:a16="http://schemas.microsoft.com/office/drawing/2014/main" id="{7F5F4023-CED5-47FE-BB6D-0F2983B0C04F}"/>
+              </a:ext>
+            </a:extLst>
+          </p:cNvPr>
+          <p:cNvCxnSpPr>
+            <a:cxnSpLocks/>
+          </p:cNvCxnSpPr>
+          <p:nvPr/>
+        </p:nvCxnSpPr>
+        <p:spPr>
+          <a:xfrm flipV="1">
+            <a:off x="3783434" y="4785865"/>
+            <a:ext cx="145144" cy="1"/>
+          </a:xfrm>
+          <a:prstGeom prst="line">
+            <a:avLst/>
+          </a:prstGeom>
+          <a:ln w="38100">
+            <a:solidFill>
+              <a:schemeClr val="bg1">
+                <a:lumMod val="50000"/>
+              </a:schemeClr>
+            </a:solidFill>
+          </a:ln>
+        </p:spPr>
+        <p:style>
+          <a:lnRef idx="1">
+            <a:schemeClr val="accent1"/>
+          </a:lnRef>
+          <a:fillRef idx="0">
+            <a:schemeClr val="accent1"/>
+          </a:fillRef>
+          <a:effectRef idx="0">
+            <a:schemeClr val="accent1"/>
+          </a:effectRef>
+          <a:fontRef idx="minor">
+            <a:schemeClr val="tx1"/>
+          </a:fontRef>
+        </p:style>
+      </p:cxnSp>
+      <p:cxnSp>
+        <p:nvCxnSpPr>
+          <p:cNvPr id="157" name="Straight Connector 156">
+            <a:extLst>
+              <a:ext uri="{FF2B5EF4-FFF2-40B4-BE49-F238E27FC236}">
+                <a16:creationId xmlns:a16="http://schemas.microsoft.com/office/drawing/2014/main" id="{40C5DD07-9350-4E26-BDC4-B8CE4191812F}"/>
+              </a:ext>
+            </a:extLst>
+          </p:cNvPr>
+          <p:cNvCxnSpPr>
+            <a:cxnSpLocks/>
+          </p:cNvCxnSpPr>
+          <p:nvPr/>
+        </p:nvCxnSpPr>
+        <p:spPr>
+          <a:xfrm flipV="1">
+            <a:off x="3774100" y="5923890"/>
+            <a:ext cx="145144" cy="1"/>
+          </a:xfrm>
+          <a:prstGeom prst="line">
+            <a:avLst/>
+          </a:prstGeom>
+          <a:ln w="38100">
+            <a:solidFill>
+              <a:schemeClr val="bg1">
+                <a:lumMod val="50000"/>
+              </a:schemeClr>
+            </a:solidFill>
+          </a:ln>
+        </p:spPr>
+        <p:style>
+          <a:lnRef idx="1">
+            <a:schemeClr val="accent1"/>
+          </a:lnRef>
+          <a:fillRef idx="0">
+            <a:schemeClr val="accent1"/>
+          </a:fillRef>
+          <a:effectRef idx="0">
+            <a:schemeClr val="accent1"/>
+          </a:effectRef>
+          <a:fontRef idx="minor">
+            <a:schemeClr val="tx1"/>
+          </a:fontRef>
+        </p:style>
+      </p:cxnSp>
+      <p:cxnSp>
+        <p:nvCxnSpPr>
+          <p:cNvPr id="159" name="Straight Connector 158">
+            <a:extLst>
+              <a:ext uri="{FF2B5EF4-FFF2-40B4-BE49-F238E27FC236}">
+                <a16:creationId xmlns:a16="http://schemas.microsoft.com/office/drawing/2014/main" id="{865A2A0C-AFD7-4717-8FA4-7BCF5A109B90}"/>
+              </a:ext>
+            </a:extLst>
+          </p:cNvPr>
+          <p:cNvCxnSpPr>
+            <a:cxnSpLocks/>
+          </p:cNvCxnSpPr>
+          <p:nvPr/>
+        </p:nvCxnSpPr>
+        <p:spPr>
+          <a:xfrm flipV="1">
+            <a:off x="3925691" y="2272388"/>
+            <a:ext cx="0" cy="3673308"/>
+          </a:xfrm>
+          <a:prstGeom prst="line">
+            <a:avLst/>
+          </a:prstGeom>
+          <a:ln w="38100">
+            <a:solidFill>
+              <a:schemeClr val="bg1">
+                <a:lumMod val="50000"/>
+              </a:schemeClr>
+            </a:solidFill>
+          </a:ln>
+        </p:spPr>
+        <p:style>
+          <a:lnRef idx="1">
+            <a:schemeClr val="accent1"/>
+          </a:lnRef>
+          <a:fillRef idx="0">
+            <a:schemeClr val="accent1"/>
+          </a:fillRef>
+          <a:effectRef idx="0">
+            <a:schemeClr val="accent1"/>
+          </a:effectRef>
+          <a:fontRef idx="minor">
+            <a:schemeClr val="tx1"/>
+          </a:fontRef>
+        </p:style>
+      </p:cxnSp>
+      <p:cxnSp>
+        <p:nvCxnSpPr>
+          <p:cNvPr id="160" name="Straight Connector 159">
+            <a:extLst>
+              <a:ext uri="{FF2B5EF4-FFF2-40B4-BE49-F238E27FC236}">
+                <a16:creationId xmlns:a16="http://schemas.microsoft.com/office/drawing/2014/main" id="{C30C5A61-F419-404F-97C8-4B3768805380}"/>
+              </a:ext>
+            </a:extLst>
+          </p:cNvPr>
+          <p:cNvCxnSpPr>
+            <a:cxnSpLocks/>
+          </p:cNvCxnSpPr>
+          <p:nvPr/>
+        </p:nvCxnSpPr>
+        <p:spPr>
+          <a:xfrm>
+            <a:off x="2376018" y="2166695"/>
+            <a:ext cx="690681" cy="1"/>
+          </a:xfrm>
+          <a:prstGeom prst="line">
+            <a:avLst/>
+          </a:prstGeom>
+          <a:ln w="38100">
+            <a:solidFill>
+              <a:srgbClr val="FF0000"/>
+            </a:solidFill>
+          </a:ln>
+        </p:spPr>
+        <p:style>
+          <a:lnRef idx="1">
+            <a:schemeClr val="accent1"/>
+          </a:lnRef>
+          <a:fillRef idx="0">
+            <a:schemeClr val="accent1"/>
+          </a:fillRef>
+          <a:effectRef idx="0">
+            <a:schemeClr val="accent1"/>
+          </a:effectRef>
+          <a:fontRef idx="minor">
+            <a:schemeClr val="tx1"/>
+          </a:fontRef>
+        </p:style>
+      </p:cxnSp>
+      <p:cxnSp>
+        <p:nvCxnSpPr>
+          <p:cNvPr id="164" name="Straight Connector 163">
+            <a:extLst>
+              <a:ext uri="{FF2B5EF4-FFF2-40B4-BE49-F238E27FC236}">
+                <a16:creationId xmlns:a16="http://schemas.microsoft.com/office/drawing/2014/main" id="{871EF2F9-53DD-4CEF-911A-3505EE08629F}"/>
+              </a:ext>
+            </a:extLst>
+          </p:cNvPr>
+          <p:cNvCxnSpPr>
+            <a:cxnSpLocks/>
+          </p:cNvCxnSpPr>
+          <p:nvPr/>
+        </p:nvCxnSpPr>
+        <p:spPr>
+          <a:xfrm flipV="1">
+            <a:off x="2391845" y="2283484"/>
+            <a:ext cx="687018" cy="6906"/>
+          </a:xfrm>
+          <a:prstGeom prst="line">
+            <a:avLst/>
+          </a:prstGeom>
+          <a:ln w="38100">
+            <a:solidFill>
+              <a:schemeClr val="bg1">
+                <a:lumMod val="50000"/>
+              </a:schemeClr>
+            </a:solidFill>
+          </a:ln>
+        </p:spPr>
+        <p:style>
+          <a:lnRef idx="1">
+            <a:schemeClr val="accent1"/>
+          </a:lnRef>
+          <a:fillRef idx="0">
+            <a:schemeClr val="accent1"/>
+          </a:fillRef>
+          <a:effectRef idx="0">
+            <a:schemeClr val="accent1"/>
+          </a:effectRef>
+          <a:fontRef idx="minor">
+            <a:schemeClr val="tx1"/>
+          </a:fontRef>
+        </p:style>
+      </p:cxnSp>
+      <p:cxnSp>
+        <p:nvCxnSpPr>
+          <p:cNvPr id="165" name="Straight Connector 164">
+            <a:extLst>
+              <a:ext uri="{FF2B5EF4-FFF2-40B4-BE49-F238E27FC236}">
+                <a16:creationId xmlns:a16="http://schemas.microsoft.com/office/drawing/2014/main" id="{CAA90050-A25D-4602-AEF8-06E81B03F368}"/>
+              </a:ext>
+            </a:extLst>
+          </p:cNvPr>
+          <p:cNvCxnSpPr>
+            <a:cxnSpLocks/>
+          </p:cNvCxnSpPr>
+          <p:nvPr/>
+        </p:nvCxnSpPr>
+        <p:spPr>
+          <a:xfrm flipV="1">
+            <a:off x="2408790" y="2144327"/>
+            <a:ext cx="0" cy="165486"/>
+          </a:xfrm>
+          <a:prstGeom prst="line">
+            <a:avLst/>
+          </a:prstGeom>
+          <a:ln w="38100">
+            <a:solidFill>
+              <a:schemeClr val="bg1">
+                <a:lumMod val="50000"/>
+              </a:schemeClr>
+            </a:solidFill>
+          </a:ln>
+        </p:spPr>
+        <p:style>
+          <a:lnRef idx="1">
+            <a:schemeClr val="accent1"/>
+          </a:lnRef>
+          <a:fillRef idx="0">
+            <a:schemeClr val="accent1"/>
+          </a:fillRef>
+          <a:effectRef idx="0">
+            <a:schemeClr val="accent1"/>
+          </a:effectRef>
+          <a:fontRef idx="minor">
+            <a:schemeClr val="tx1"/>
+          </a:fontRef>
+        </p:style>
+      </p:cxnSp>
+      <p:cxnSp>
+        <p:nvCxnSpPr>
+          <p:cNvPr id="168" name="Straight Connector 167">
+            <a:extLst>
+              <a:ext uri="{FF2B5EF4-FFF2-40B4-BE49-F238E27FC236}">
+                <a16:creationId xmlns:a16="http://schemas.microsoft.com/office/drawing/2014/main" id="{9E90DAC6-DABC-4ACF-9545-B3105989E926}"/>
+              </a:ext>
+            </a:extLst>
+          </p:cNvPr>
+          <p:cNvCxnSpPr>
+            <a:cxnSpLocks/>
+          </p:cNvCxnSpPr>
+          <p:nvPr/>
+        </p:nvCxnSpPr>
+        <p:spPr>
+          <a:xfrm>
+            <a:off x="8048467" y="2174005"/>
+            <a:ext cx="345341" cy="0"/>
+          </a:xfrm>
+          <a:prstGeom prst="line">
+            <a:avLst/>
+          </a:prstGeom>
+          <a:ln w="38100">
+            <a:solidFill>
+              <a:srgbClr val="FF0000"/>
+            </a:solidFill>
+          </a:ln>
+        </p:spPr>
+        <p:style>
+          <a:lnRef idx="1">
+            <a:schemeClr val="accent1"/>
+          </a:lnRef>
+          <a:fillRef idx="0">
+            <a:schemeClr val="accent1"/>
+          </a:fillRef>
+          <a:effectRef idx="0">
+            <a:schemeClr val="accent1"/>
+          </a:effectRef>
+          <a:fontRef idx="minor">
+            <a:schemeClr val="tx1"/>
+          </a:fontRef>
+        </p:style>
+      </p:cxnSp>
+      <p:cxnSp>
+        <p:nvCxnSpPr>
+          <p:cNvPr id="170" name="Straight Connector 169">
+            <a:extLst>
+              <a:ext uri="{FF2B5EF4-FFF2-40B4-BE49-F238E27FC236}">
+                <a16:creationId xmlns:a16="http://schemas.microsoft.com/office/drawing/2014/main" id="{837A820F-F5A4-4D53-8086-5E563BC02133}"/>
+              </a:ext>
+            </a:extLst>
+          </p:cNvPr>
+          <p:cNvCxnSpPr>
+            <a:cxnSpLocks/>
+          </p:cNvCxnSpPr>
+          <p:nvPr/>
+        </p:nvCxnSpPr>
+        <p:spPr>
+          <a:xfrm>
+            <a:off x="8048467" y="2272034"/>
+            <a:ext cx="378484" cy="0"/>
+          </a:xfrm>
+          <a:prstGeom prst="line">
+            <a:avLst/>
+          </a:prstGeom>
+          <a:ln w="38100">
+            <a:solidFill>
+              <a:schemeClr val="bg1">
+                <a:lumMod val="50000"/>
+              </a:schemeClr>
+            </a:solidFill>
+          </a:ln>
+        </p:spPr>
+        <p:style>
+          <a:lnRef idx="1">
+            <a:schemeClr val="accent1"/>
+          </a:lnRef>
+          <a:fillRef idx="0">
+            <a:schemeClr val="accent1"/>
+          </a:fillRef>
+          <a:effectRef idx="0">
+            <a:schemeClr val="accent1"/>
+          </a:effectRef>
+          <a:fontRef idx="minor">
+            <a:schemeClr val="tx1"/>
+          </a:fontRef>
+        </p:style>
+      </p:cxnSp>
+      <p:cxnSp>
+        <p:nvCxnSpPr>
+          <p:cNvPr id="172" name="Straight Connector 171">
+            <a:extLst>
+              <a:ext uri="{FF2B5EF4-FFF2-40B4-BE49-F238E27FC236}">
+                <a16:creationId xmlns:a16="http://schemas.microsoft.com/office/drawing/2014/main" id="{FA078E9A-6E39-46E0-B2F6-A8844234D5E1}"/>
+              </a:ext>
+            </a:extLst>
+          </p:cNvPr>
+          <p:cNvCxnSpPr>
+            <a:cxnSpLocks/>
+          </p:cNvCxnSpPr>
+          <p:nvPr/>
+        </p:nvCxnSpPr>
+        <p:spPr>
+          <a:xfrm flipV="1">
+            <a:off x="8404766" y="2151664"/>
+            <a:ext cx="0" cy="120370"/>
+          </a:xfrm>
+          <a:prstGeom prst="line">
+            <a:avLst/>
+          </a:prstGeom>
+          <a:ln w="38100">
+            <a:solidFill>
+              <a:schemeClr val="bg1">
+                <a:lumMod val="50000"/>
+              </a:schemeClr>
             </a:solidFill>
           </a:ln>
         </p:spPr>

</xml_diff>